<commit_message>
learning_python: Added red lines to slice presentation around slices to make clearer, and in list_comprehensions presentation changed the one liner to actually be on one line
</commit_message>
<xml_diff>
--- a/python/presentations/learning_python/09_list_comprehensions.pptx
+++ b/python/presentations/learning_python/09_list_comprehensions.pptx
@@ -684,7 +684,7 @@
               <a:pPr>
                 <a:defRPr/>
               </a:pPr>
-              <a:t>09/10/2018</a:t>
+              <a:t>17/12/2018</a:t>
             </a:fld>
             <a:endParaRPr lang="en-GB"/>
           </a:p>
@@ -921,7 +921,7 @@
               <a:pPr>
                 <a:defRPr/>
               </a:pPr>
-              <a:t>09/10/2018</a:t>
+              <a:t>17/12/2018</a:t>
             </a:fld>
             <a:endParaRPr lang="en-GB"/>
           </a:p>
@@ -1567,7 +1567,7 @@
               <a:pPr>
                 <a:defRPr/>
               </a:pPr>
-              <a:t>09/10/2018</a:t>
+              <a:t>17/12/2018</a:t>
             </a:fld>
             <a:endParaRPr lang="en-GB"/>
           </a:p>
@@ -6889,7 +6889,7 @@
           <a:lstStyle/>
           <a:p>
             <a:r>
-              <a:rPr lang="en-GB" altLang="en-US" smtClean="0"/>
+              <a:rPr lang="en-GB" altLang="en-US" dirty="0" smtClean="0"/>
               <a:t>Can be simplified to…</a:t>
             </a:r>
           </a:p>
@@ -6905,8 +6905,8 @@
         </p:nvSpPr>
         <p:spPr bwMode="auto">
           <a:xfrm>
-            <a:off x="611188" y="1268413"/>
-            <a:ext cx="7848600" cy="2862262"/>
+            <a:off x="467544" y="1268760"/>
+            <a:ext cx="8496944" cy="2400657"/>
           </a:xfrm>
           <a:prstGeom prst="rect">
             <a:avLst/>
@@ -6936,7 +6936,7 @@
           </a:extLst>
         </p:spPr>
         <p:txBody>
-          <a:bodyPr>
+          <a:bodyPr wrap="square">
             <a:spAutoFit/>
           </a:bodyPr>
           <a:lstStyle>
@@ -7258,7 +7258,14 @@
                 <a:latin typeface="Courier New" panose="02070309020205020404" pitchFamily="49" charset="0"/>
                 <a:cs typeface="Courier New" panose="02070309020205020404" pitchFamily="49" charset="0"/>
               </a:rPr>
-              <a:t>   [x**2 </a:t>
+              <a:t>[</a:t>
+            </a:r>
+            <a:r>
+              <a:rPr lang="en-GB" altLang="en-US" sz="2400" dirty="0" smtClean="0">
+                <a:latin typeface="Courier New" panose="02070309020205020404" pitchFamily="49" charset="0"/>
+                <a:cs typeface="Courier New" panose="02070309020205020404" pitchFamily="49" charset="0"/>
+              </a:rPr>
+              <a:t>x**2 </a:t>
             </a:r>
             <a:r>
               <a:rPr lang="en-GB" altLang="en-US" sz="2400" b="1" dirty="0" smtClean="0">
@@ -7286,27 +7293,14 @@
                 <a:latin typeface="Courier New" panose="02070309020205020404" pitchFamily="49" charset="0"/>
                 <a:cs typeface="Courier New" panose="02070309020205020404" pitchFamily="49" charset="0"/>
               </a:rPr>
-              <a:t> range(10) </a:t>
-            </a:r>
-          </a:p>
-          <a:p>
-            <a:pPr eaLnBrk="1" hangingPunct="1">
-              <a:lnSpc>
-                <a:spcPct val="125000"/>
-              </a:lnSpc>
-              <a:spcBef>
-                <a:spcPct val="0"/>
-              </a:spcBef>
-              <a:buFontTx/>
-              <a:buNone/>
-              <a:defRPr/>
-            </a:pPr>
+              <a:t> range(10</a:t>
+            </a:r>
             <a:r>
               <a:rPr lang="en-GB" altLang="en-US" sz="2400" dirty="0" smtClean="0">
                 <a:latin typeface="Courier New" panose="02070309020205020404" pitchFamily="49" charset="0"/>
                 <a:cs typeface="Courier New" panose="02070309020205020404" pitchFamily="49" charset="0"/>
               </a:rPr>
-              <a:t>             </a:t>
+              <a:t>) </a:t>
             </a:r>
             <a:r>
               <a:rPr lang="en-GB" altLang="en-US" sz="2400" b="1" dirty="0" smtClean="0">
@@ -7320,7 +7314,14 @@
                 <a:latin typeface="Courier New" panose="02070309020205020404" pitchFamily="49" charset="0"/>
                 <a:cs typeface="Courier New" panose="02070309020205020404" pitchFamily="49" charset="0"/>
               </a:rPr>
-              <a:t> x**2 % 2 == 0]</a:t>
+              <a:t> </a:t>
+            </a:r>
+            <a:r>
+              <a:rPr lang="en-GB" altLang="en-US" sz="2400" dirty="0" smtClean="0">
+                <a:latin typeface="Courier New" panose="02070309020205020404" pitchFamily="49" charset="0"/>
+                <a:cs typeface="Courier New" panose="02070309020205020404" pitchFamily="49" charset="0"/>
+              </a:rPr>
+              <a:t>x**2 % 2 == 0]</a:t>
             </a:r>
           </a:p>
           <a:p>
@@ -7627,7 +7628,7 @@
               <a:buNone/>
             </a:pPr>
             <a:r>
-              <a:rPr lang="en-GB" altLang="en-US">
+              <a:rPr lang="en-GB" altLang="en-US" dirty="0">
                 <a:latin typeface="Arial" panose="020B0604020202020204" pitchFamily="34" charset="0"/>
               </a:rPr>
               <a:t>See more info at:</a:t>
@@ -7645,14 +7646,14 @@
               <a:buNone/>
             </a:pPr>
             <a:r>
-              <a:rPr lang="en-GB" altLang="en-US" sz="2700">
+              <a:rPr lang="en-GB" altLang="en-US" sz="2700" dirty="0">
                 <a:latin typeface="Arial" panose="020B0604020202020204" pitchFamily="34" charset="0"/>
                 <a:hlinkClick r:id="rId2"/>
               </a:rPr>
               <a:t>https://www.python.org/dev/peps/pep-0202/#examples</a:t>
             </a:r>
             <a:r>
-              <a:rPr lang="en-GB" altLang="en-US" sz="2700">
+              <a:rPr lang="en-GB" altLang="en-US" sz="2700" dirty="0">
                 <a:latin typeface="Arial" panose="020B0604020202020204" pitchFamily="34" charset="0"/>
               </a:rPr>
               <a:t> </a:t>
@@ -7667,9 +7668,9 @@
           <p:nvPr/>
         </p:nvSpPr>
         <p:spPr>
-          <a:xfrm>
-            <a:off x="6659563" y="1196975"/>
-            <a:ext cx="2089150" cy="1655763"/>
+          <a:xfrm rot="21376916">
+            <a:off x="6660232" y="836712"/>
+            <a:ext cx="2076882" cy="940733"/>
           </a:xfrm>
           <a:prstGeom prst="leftArrow">
             <a:avLst/>

</xml_diff>